<commit_message>
Fixed spacing in diagram
</commit_message>
<xml_diff>
--- a/docs/deployment_guide/images/uipath-automation-suite-architecture-diagram.pptx
+++ b/docs/deployment_guide/images/uipath-automation-suite-architecture-diagram.pptx
@@ -5858,7 +5858,7 @@
         </p:blipFill>
         <p:spPr bwMode="auto">
           <a:xfrm>
-            <a:off x="4996729" y="5469561"/>
+            <a:off x="5051641" y="5460193"/>
             <a:ext cx="457200" cy="457200"/>
           </a:xfrm>
           <a:prstGeom prst="rect">
@@ -5918,7 +5918,7 @@
         </p:blipFill>
         <p:spPr bwMode="auto">
           <a:xfrm>
-            <a:off x="4965579" y="3429941"/>
+            <a:off x="5034336" y="3424825"/>
             <a:ext cx="457200" cy="457200"/>
           </a:xfrm>
           <a:prstGeom prst="rect">
@@ -5977,7 +5977,7 @@
         </p:blipFill>
         <p:spPr>
           <a:xfrm>
-            <a:off x="5041779" y="4184688"/>
+            <a:off x="5086967" y="4185653"/>
             <a:ext cx="381000" cy="381000"/>
           </a:xfrm>
           <a:prstGeom prst="rect">
@@ -6013,7 +6013,7 @@
         </p:blipFill>
         <p:spPr>
           <a:xfrm>
-            <a:off x="5025861" y="6158444"/>
+            <a:off x="5091670" y="6167816"/>
             <a:ext cx="381000" cy="381000"/>
           </a:xfrm>
           <a:prstGeom prst="rect">

</xml_diff>

<commit_message>
Updated diagram per peer review
</commit_message>
<xml_diff>
--- a/docs/deployment_guide/images/uipath-automation-suite-architecture-diagram.pptx
+++ b/docs/deployment_guide/images/uipath-automation-suite-architecture-diagram.pptx
@@ -243,7 +243,7 @@
           <a:p>
             <a:fld id="{E329BFFA-69BC-4FD7-8AFA-48761B12D012}" type="datetimeFigureOut">
               <a:rPr lang="en-US" smtClean="0"/>
-              <a:t>10/23/2022</a:t>
+              <a:t>10/28/2022</a:t>
             </a:fld>
             <a:endParaRPr lang="en-US"/>
           </a:p>
@@ -413,7 +413,7 @@
           <a:p>
             <a:fld id="{E329BFFA-69BC-4FD7-8AFA-48761B12D012}" type="datetimeFigureOut">
               <a:rPr lang="en-US" smtClean="0"/>
-              <a:t>10/23/2022</a:t>
+              <a:t>10/28/2022</a:t>
             </a:fld>
             <a:endParaRPr lang="en-US"/>
           </a:p>
@@ -593,7 +593,7 @@
           <a:p>
             <a:fld id="{E329BFFA-69BC-4FD7-8AFA-48761B12D012}" type="datetimeFigureOut">
               <a:rPr lang="en-US" smtClean="0"/>
-              <a:t>10/23/2022</a:t>
+              <a:t>10/28/2022</a:t>
             </a:fld>
             <a:endParaRPr lang="en-US"/>
           </a:p>
@@ -763,7 +763,7 @@
           <a:p>
             <a:fld id="{E329BFFA-69BC-4FD7-8AFA-48761B12D012}" type="datetimeFigureOut">
               <a:rPr lang="en-US" smtClean="0"/>
-              <a:t>10/23/2022</a:t>
+              <a:t>10/28/2022</a:t>
             </a:fld>
             <a:endParaRPr lang="en-US"/>
           </a:p>
@@ -1007,7 +1007,7 @@
           <a:p>
             <a:fld id="{E329BFFA-69BC-4FD7-8AFA-48761B12D012}" type="datetimeFigureOut">
               <a:rPr lang="en-US" smtClean="0"/>
-              <a:t>10/23/2022</a:t>
+              <a:t>10/28/2022</a:t>
             </a:fld>
             <a:endParaRPr lang="en-US"/>
           </a:p>
@@ -1239,7 +1239,7 @@
           <a:p>
             <a:fld id="{E329BFFA-69BC-4FD7-8AFA-48761B12D012}" type="datetimeFigureOut">
               <a:rPr lang="en-US" smtClean="0"/>
-              <a:t>10/23/2022</a:t>
+              <a:t>10/28/2022</a:t>
             </a:fld>
             <a:endParaRPr lang="en-US"/>
           </a:p>
@@ -1606,7 +1606,7 @@
           <a:p>
             <a:fld id="{E329BFFA-69BC-4FD7-8AFA-48761B12D012}" type="datetimeFigureOut">
               <a:rPr lang="en-US" smtClean="0"/>
-              <a:t>10/23/2022</a:t>
+              <a:t>10/28/2022</a:t>
             </a:fld>
             <a:endParaRPr lang="en-US"/>
           </a:p>
@@ -1724,7 +1724,7 @@
           <a:p>
             <a:fld id="{E329BFFA-69BC-4FD7-8AFA-48761B12D012}" type="datetimeFigureOut">
               <a:rPr lang="en-US" smtClean="0"/>
-              <a:t>10/23/2022</a:t>
+              <a:t>10/28/2022</a:t>
             </a:fld>
             <a:endParaRPr lang="en-US"/>
           </a:p>
@@ -1819,7 +1819,7 @@
           <a:p>
             <a:fld id="{E329BFFA-69BC-4FD7-8AFA-48761B12D012}" type="datetimeFigureOut">
               <a:rPr lang="en-US" smtClean="0"/>
-              <a:t>10/23/2022</a:t>
+              <a:t>10/28/2022</a:t>
             </a:fld>
             <a:endParaRPr lang="en-US"/>
           </a:p>
@@ -2096,7 +2096,7 @@
           <a:p>
             <a:fld id="{E329BFFA-69BC-4FD7-8AFA-48761B12D012}" type="datetimeFigureOut">
               <a:rPr lang="en-US" smtClean="0"/>
-              <a:t>10/23/2022</a:t>
+              <a:t>10/28/2022</a:t>
             </a:fld>
             <a:endParaRPr lang="en-US"/>
           </a:p>
@@ -2353,7 +2353,7 @@
           <a:p>
             <a:fld id="{E329BFFA-69BC-4FD7-8AFA-48761B12D012}" type="datetimeFigureOut">
               <a:rPr lang="en-US" smtClean="0"/>
-              <a:t>10/23/2022</a:t>
+              <a:t>10/28/2022</a:t>
             </a:fld>
             <a:endParaRPr lang="en-US"/>
           </a:p>
@@ -2566,7 +2566,7 @@
           <a:p>
             <a:fld id="{E329BFFA-69BC-4FD7-8AFA-48761B12D012}" type="datetimeFigureOut">
               <a:rPr lang="en-US" smtClean="0"/>
-              <a:t>10/23/2022</a:t>
+              <a:t>10/28/2022</a:t>
             </a:fld>
             <a:endParaRPr lang="en-US"/>
           </a:p>
@@ -2973,10 +2973,10 @@
       </p:grpSpPr>
       <p:sp>
         <p:nvSpPr>
-          <p:cNvPr id="34" name="Rectangle 33">
+          <p:cNvPr id="50" name="Rectangle 49">
             <a:extLst>
               <a:ext uri="{FF2B5EF4-FFF2-40B4-BE49-F238E27FC236}">
-                <a16:creationId xmlns:a16="http://schemas.microsoft.com/office/drawing/2014/main" id="{1E165987-BCF0-EC14-7519-7713696A0658}"/>
+                <a16:creationId xmlns:a16="http://schemas.microsoft.com/office/drawing/2014/main" id="{635809F7-0B79-4CD5-8F09-A13A7B99CE1F}"/>
               </a:ext>
             </a:extLst>
           </p:cNvPr>
@@ -2985,8 +2985,8 @@
         </p:nvSpPr>
         <p:spPr>
           <a:xfrm>
-            <a:off x="503434" y="503434"/>
-            <a:ext cx="10285062" cy="7828908"/>
+            <a:off x="2382798" y="4159231"/>
+            <a:ext cx="5725865" cy="817479"/>
           </a:xfrm>
           <a:prstGeom prst="rect">
             <a:avLst/>
@@ -2994,8 +2994,9 @@
           <a:noFill/>
           <a:ln w="12700">
             <a:solidFill>
-              <a:schemeClr val="tx1"/>
+              <a:srgbClr val="D86613"/>
             </a:solidFill>
+            <a:prstDash val="dash"/>
           </a:ln>
         </p:spPr>
         <p:style>
@@ -3015,66 +3016,65 @@
           </a:fontRef>
         </p:style>
         <p:txBody>
-          <a:bodyPr lIns="502920" tIns="91440"/>
-          <a:lstStyle/>
-          <a:p>
-            <a:pPr>
+          <a:bodyPr tIns="91440"/>
+          <a:lstStyle/>
+          <a:p>
+            <a:pPr algn="ctr">
               <a:defRPr/>
             </a:pPr>
+            <a:endParaRPr lang="en-US" sz="1200" dirty="0">
+              <a:solidFill>
+                <a:srgbClr val="D86613"/>
+              </a:solidFill>
+              <a:latin typeface="Arial" panose="020B0604020202020204" pitchFamily="34" charset="0"/>
+              <a:cs typeface="Arial" panose="020B0604020202020204" pitchFamily="34" charset="0"/>
+            </a:endParaRPr>
+          </a:p>
+          <a:p>
+            <a:pPr algn="ctr">
+              <a:defRPr/>
+            </a:pPr>
+            <a:endParaRPr lang="en-US" sz="1200" dirty="0">
+              <a:solidFill>
+                <a:srgbClr val="D86613"/>
+              </a:solidFill>
+              <a:latin typeface="Arial" panose="020B0604020202020204" pitchFamily="34" charset="0"/>
+              <a:cs typeface="Arial" panose="020B0604020202020204" pitchFamily="34" charset="0"/>
+            </a:endParaRPr>
+          </a:p>
+          <a:p>
+            <a:pPr algn="ctr">
+              <a:defRPr/>
+            </a:pPr>
             <a:r>
               <a:rPr lang="en-US" sz="1200" dirty="0">
                 <a:solidFill>
-                  <a:sysClr val="windowText" lastClr="000000"/>
+                  <a:srgbClr val="D86613"/>
                 </a:solidFill>
                 <a:latin typeface="Arial" panose="020B0604020202020204" pitchFamily="34" charset="0"/>
                 <a:cs typeface="Arial" panose="020B0604020202020204" pitchFamily="34" charset="0"/>
               </a:rPr>
-              <a:t>AWS Cloud</a:t>
-            </a:r>
-          </a:p>
-        </p:txBody>
-      </p:sp>
-      <p:pic>
-        <p:nvPicPr>
-          <p:cNvPr id="35" name="Graphic 34">
+              <a:t>Auto Scaling </a:t>
+            </a:r>
+            <a:r>
+              <a:rPr lang="en-US" sz="1100" dirty="0">
+                <a:solidFill>
+                  <a:srgbClr val="D86613"/>
+                </a:solidFill>
+                <a:latin typeface="Arial" panose="020B0604020202020204" pitchFamily="34" charset="0"/>
+                <a:cs typeface="Arial" panose="020B0604020202020204" pitchFamily="34" charset="0"/>
+              </a:rPr>
+              <a:t>group</a:t>
+            </a:r>
+          </a:p>
+        </p:txBody>
+      </p:sp>
+      <p:sp>
+        <p:nvSpPr>
+          <p:cNvPr id="34" name="Rectangle 33">
             <a:extLst>
               <a:ext uri="{FF2B5EF4-FFF2-40B4-BE49-F238E27FC236}">
-                <a16:creationId xmlns:a16="http://schemas.microsoft.com/office/drawing/2014/main" id="{4F35C9D8-DFA4-B1D3-9F68-DC401F661E52}"/>
-              </a:ext>
-            </a:extLst>
-          </p:cNvPr>
-          <p:cNvPicPr>
-            <a:picLocks noChangeAspect="1"/>
-          </p:cNvPicPr>
-          <p:nvPr/>
-        </p:nvPicPr>
-        <p:blipFill>
-          <a:blip r:embed="rId2">
-            <a:extLst>
-              <a:ext uri="{96DAC541-7B7A-43D3-8B79-37D633B846F1}">
-                <asvg:svgBlip xmlns:asvg="http://schemas.microsoft.com/office/drawing/2016/SVG/main" r:embed="rId3"/>
-              </a:ext>
-            </a:extLst>
-          </a:blip>
-          <a:srcRect/>
-          <a:stretch/>
-        </p:blipFill>
-        <p:spPr>
-          <a:xfrm>
-            <a:off x="503433" y="503434"/>
-            <a:ext cx="381000" cy="381000"/>
-          </a:xfrm>
-          <a:prstGeom prst="rect">
-            <a:avLst/>
-          </a:prstGeom>
-        </p:spPr>
-      </p:pic>
-      <p:sp>
-        <p:nvSpPr>
-          <p:cNvPr id="36" name="Rectangle 35">
-            <a:extLst>
-              <a:ext uri="{FF2B5EF4-FFF2-40B4-BE49-F238E27FC236}">
-                <a16:creationId xmlns:a16="http://schemas.microsoft.com/office/drawing/2014/main" id="{4F1E5BB9-6AFD-3AF2-EB33-BC230EB5E7EA}"/>
+                <a16:creationId xmlns:a16="http://schemas.microsoft.com/office/drawing/2014/main" id="{1E165987-BCF0-EC14-7519-7713696A0658}"/>
               </a:ext>
             </a:extLst>
           </p:cNvPr>
@@ -3083,8 +3083,8 @@
         </p:nvSpPr>
         <p:spPr>
           <a:xfrm>
-            <a:off x="1078786" y="967835"/>
-            <a:ext cx="7911101" cy="7123456"/>
+            <a:off x="503434" y="503434"/>
+            <a:ext cx="10285062" cy="7828908"/>
           </a:xfrm>
           <a:prstGeom prst="rect">
             <a:avLst/>
@@ -3092,7 +3092,7 @@
           <a:noFill/>
           <a:ln w="12700">
             <a:solidFill>
-              <a:srgbClr val="1E8900"/>
+              <a:schemeClr val="tx1"/>
             </a:solidFill>
           </a:ln>
         </p:spPr>
@@ -3121,24 +3121,58 @@
             </a:pPr>
             <a:r>
               <a:rPr lang="en-US" sz="1200" dirty="0">
-                <a:ln w="0"/>
-                <a:solidFill>
-                  <a:srgbClr val="1E8900"/>
+                <a:solidFill>
+                  <a:sysClr val="windowText" lastClr="000000"/>
                 </a:solidFill>
                 <a:latin typeface="Arial" panose="020B0604020202020204" pitchFamily="34" charset="0"/>
                 <a:cs typeface="Arial" panose="020B0604020202020204" pitchFamily="34" charset="0"/>
               </a:rPr>
-              <a:t>VPC</a:t>
-            </a:r>
-          </a:p>
-        </p:txBody>
-      </p:sp>
-      <p:sp>
-        <p:nvSpPr>
-          <p:cNvPr id="38" name="Rectangle 37">
+              <a:t>AWS Cloud</a:t>
+            </a:r>
+          </a:p>
+        </p:txBody>
+      </p:sp>
+      <p:pic>
+        <p:nvPicPr>
+          <p:cNvPr id="35" name="Graphic 34">
             <a:extLst>
               <a:ext uri="{FF2B5EF4-FFF2-40B4-BE49-F238E27FC236}">
-                <a16:creationId xmlns:a16="http://schemas.microsoft.com/office/drawing/2014/main" id="{DBE16690-27C1-9339-353E-FB67256088B7}"/>
+                <a16:creationId xmlns:a16="http://schemas.microsoft.com/office/drawing/2014/main" id="{4F35C9D8-DFA4-B1D3-9F68-DC401F661E52}"/>
+              </a:ext>
+            </a:extLst>
+          </p:cNvPr>
+          <p:cNvPicPr>
+            <a:picLocks noChangeAspect="1"/>
+          </p:cNvPicPr>
+          <p:nvPr/>
+        </p:nvPicPr>
+        <p:blipFill>
+          <a:blip r:embed="rId2">
+            <a:extLst>
+              <a:ext uri="{96DAC541-7B7A-43D3-8B79-37D633B846F1}">
+                <asvg:svgBlip xmlns:asvg="http://schemas.microsoft.com/office/drawing/2016/SVG/main" r:embed="rId3"/>
+              </a:ext>
+            </a:extLst>
+          </a:blip>
+          <a:srcRect/>
+          <a:stretch/>
+        </p:blipFill>
+        <p:spPr>
+          <a:xfrm>
+            <a:off x="503433" y="503434"/>
+            <a:ext cx="381000" cy="381000"/>
+          </a:xfrm>
+          <a:prstGeom prst="rect">
+            <a:avLst/>
+          </a:prstGeom>
+        </p:spPr>
+      </p:pic>
+      <p:sp>
+        <p:nvSpPr>
+          <p:cNvPr id="36" name="Rectangle 35">
+            <a:extLst>
+              <a:ext uri="{FF2B5EF4-FFF2-40B4-BE49-F238E27FC236}">
+                <a16:creationId xmlns:a16="http://schemas.microsoft.com/office/drawing/2014/main" id="{4F1E5BB9-6AFD-3AF2-EB33-BC230EB5E7EA}"/>
               </a:ext>
             </a:extLst>
           </p:cNvPr>
@@ -3147,8 +3181,8 @@
         </p:nvSpPr>
         <p:spPr>
           <a:xfrm>
-            <a:off x="1963896" y="632255"/>
-            <a:ext cx="2304288" cy="7566523"/>
+            <a:off x="1078786" y="967835"/>
+            <a:ext cx="7911101" cy="7123456"/>
           </a:xfrm>
           <a:prstGeom prst="rect">
             <a:avLst/>
@@ -3156,9 +3190,8 @@
           <a:noFill/>
           <a:ln w="12700">
             <a:solidFill>
-              <a:srgbClr val="5B9CD5"/>
+              <a:srgbClr val="1E8900"/>
             </a:solidFill>
-            <a:prstDash val="dash"/>
           </a:ln>
         </p:spPr>
         <p:style>
@@ -3178,31 +3211,32 @@
           </a:fontRef>
         </p:style>
         <p:txBody>
-          <a:bodyPr tIns="91440"/>
-          <a:lstStyle/>
-          <a:p>
-            <a:pPr algn="ctr">
+          <a:bodyPr lIns="502920" tIns="91440"/>
+          <a:lstStyle/>
+          <a:p>
+            <a:pPr>
               <a:defRPr/>
             </a:pPr>
             <a:r>
               <a:rPr lang="en-US" sz="1200" dirty="0">
-                <a:solidFill>
-                  <a:srgbClr val="5B9CD5"/>
+                <a:ln w="0"/>
+                <a:solidFill>
+                  <a:srgbClr val="1E8900"/>
                 </a:solidFill>
                 <a:latin typeface="Arial" panose="020B0604020202020204" pitchFamily="34" charset="0"/>
                 <a:cs typeface="Arial" panose="020B0604020202020204" pitchFamily="34" charset="0"/>
               </a:rPr>
-              <a:t>Availability Zone 1</a:t>
-            </a:r>
-          </a:p>
-        </p:txBody>
-      </p:sp>
-      <p:sp>
-        <p:nvSpPr>
-          <p:cNvPr id="40" name="Rectangle 39">
+              <a:t>VPC</a:t>
+            </a:r>
+          </a:p>
+        </p:txBody>
+      </p:sp>
+      <p:sp>
+        <p:nvSpPr>
+          <p:cNvPr id="38" name="Rectangle 37">
             <a:extLst>
               <a:ext uri="{FF2B5EF4-FFF2-40B4-BE49-F238E27FC236}">
-                <a16:creationId xmlns:a16="http://schemas.microsoft.com/office/drawing/2014/main" id="{2DF3ED67-EC6C-10CE-8376-A5B241E810EC}"/>
+                <a16:creationId xmlns:a16="http://schemas.microsoft.com/office/drawing/2014/main" id="{DBE16690-27C1-9339-353E-FB67256088B7}"/>
               </a:ext>
             </a:extLst>
           </p:cNvPr>
@@ -3211,8 +3245,8 @@
         </p:nvSpPr>
         <p:spPr>
           <a:xfrm>
-            <a:off x="6289340" y="632254"/>
-            <a:ext cx="2302502" cy="7566523"/>
+            <a:off x="1963896" y="632255"/>
+            <a:ext cx="2304288" cy="7566523"/>
           </a:xfrm>
           <a:prstGeom prst="rect">
             <a:avLst/>
@@ -3256,17 +3290,17 @@
                 <a:latin typeface="Arial" panose="020B0604020202020204" pitchFamily="34" charset="0"/>
                 <a:cs typeface="Arial" panose="020B0604020202020204" pitchFamily="34" charset="0"/>
               </a:rPr>
-              <a:t>Availability Zone 2</a:t>
-            </a:r>
-          </a:p>
-        </p:txBody>
-      </p:sp>
-      <p:sp>
-        <p:nvSpPr>
-          <p:cNvPr id="41" name="Rectangle 40">
+              <a:t>Availability Zone 1</a:t>
+            </a:r>
+          </a:p>
+        </p:txBody>
+      </p:sp>
+      <p:sp>
+        <p:nvSpPr>
+          <p:cNvPr id="40" name="Rectangle 39">
             <a:extLst>
               <a:ext uri="{FF2B5EF4-FFF2-40B4-BE49-F238E27FC236}">
-                <a16:creationId xmlns:a16="http://schemas.microsoft.com/office/drawing/2014/main" id="{51DE687F-38A1-5C61-75F7-A7ED6F9F32E9}"/>
+                <a16:creationId xmlns:a16="http://schemas.microsoft.com/office/drawing/2014/main" id="{2DF3ED67-EC6C-10CE-8376-A5B241E810EC}"/>
               </a:ext>
             </a:extLst>
           </p:cNvPr>
@@ -3275,19 +3309,17 @@
         </p:nvSpPr>
         <p:spPr>
           <a:xfrm>
-            <a:off x="2147441" y="1081042"/>
-            <a:ext cx="1925637" cy="1376598"/>
+            <a:off x="6289340" y="632254"/>
+            <a:ext cx="2302502" cy="7566523"/>
           </a:xfrm>
           <a:prstGeom prst="rect">
             <a:avLst/>
           </a:prstGeom>
-          <a:solidFill>
-            <a:srgbClr val="1D8900">
-              <a:alpha val="9804"/>
-            </a:srgbClr>
-          </a:solidFill>
+          <a:noFill/>
           <a:ln w="12700">
-            <a:noFill/>
+            <a:solidFill>
+              <a:srgbClr val="5B9CD5"/>
+            </a:solidFill>
             <a:prstDash val="dash"/>
           </a:ln>
         </p:spPr>
@@ -3308,31 +3340,31 @@
           </a:fontRef>
         </p:style>
         <p:txBody>
-          <a:bodyPr lIns="502920"/>
-          <a:lstStyle/>
-          <a:p>
-            <a:pPr>
+          <a:bodyPr tIns="91440"/>
+          <a:lstStyle/>
+          <a:p>
+            <a:pPr algn="ctr">
               <a:defRPr/>
             </a:pPr>
             <a:r>
               <a:rPr lang="en-US" sz="1200" dirty="0">
                 <a:solidFill>
-                  <a:srgbClr val="1E8900"/>
+                  <a:srgbClr val="5B9CD5"/>
                 </a:solidFill>
                 <a:latin typeface="Arial" panose="020B0604020202020204" pitchFamily="34" charset="0"/>
                 <a:cs typeface="Arial" panose="020B0604020202020204" pitchFamily="34" charset="0"/>
               </a:rPr>
-              <a:t>Public subnet</a:t>
-            </a:r>
-          </a:p>
-        </p:txBody>
-      </p:sp>
-      <p:sp>
-        <p:nvSpPr>
-          <p:cNvPr id="46" name="Rectangle 45">
+              <a:t>Availability Zone 2</a:t>
+            </a:r>
+          </a:p>
+        </p:txBody>
+      </p:sp>
+      <p:sp>
+        <p:nvSpPr>
+          <p:cNvPr id="41" name="Rectangle 40">
             <a:extLst>
               <a:ext uri="{FF2B5EF4-FFF2-40B4-BE49-F238E27FC236}">
-                <a16:creationId xmlns:a16="http://schemas.microsoft.com/office/drawing/2014/main" id="{26367F76-BA92-EF5B-30C2-5D7710AC5CA3}"/>
+                <a16:creationId xmlns:a16="http://schemas.microsoft.com/office/drawing/2014/main" id="{51DE687F-38A1-5C61-75F7-A7ED6F9F32E9}"/>
               </a:ext>
             </a:extLst>
           </p:cNvPr>
@@ -3341,8 +3373,8 @@
         </p:nvSpPr>
         <p:spPr>
           <a:xfrm>
-            <a:off x="6426011" y="1069786"/>
-            <a:ext cx="2009256" cy="1387854"/>
+            <a:off x="2147441" y="1081042"/>
+            <a:ext cx="1925637" cy="1376598"/>
           </a:xfrm>
           <a:prstGeom prst="rect">
             <a:avLst/>
@@ -3395,10 +3427,10 @@
       </p:sp>
       <p:sp>
         <p:nvSpPr>
-          <p:cNvPr id="48" name="Rectangle 47">
+          <p:cNvPr id="46" name="Rectangle 45">
             <a:extLst>
               <a:ext uri="{FF2B5EF4-FFF2-40B4-BE49-F238E27FC236}">
-                <a16:creationId xmlns:a16="http://schemas.microsoft.com/office/drawing/2014/main" id="{3DB0534F-BDB6-E134-6921-F078B2C23C02}"/>
+                <a16:creationId xmlns:a16="http://schemas.microsoft.com/office/drawing/2014/main" id="{26367F76-BA92-EF5B-30C2-5D7710AC5CA3}"/>
               </a:ext>
             </a:extLst>
           </p:cNvPr>
@@ -3407,17 +3439,20 @@
         </p:nvSpPr>
         <p:spPr>
           <a:xfrm>
-            <a:off x="2261675" y="1532771"/>
-            <a:ext cx="5997802" cy="786324"/>
+            <a:off x="6426011" y="1069786"/>
+            <a:ext cx="2009256" cy="1387854"/>
           </a:xfrm>
           <a:prstGeom prst="rect">
             <a:avLst/>
           </a:prstGeom>
-          <a:noFill/>
+          <a:solidFill>
+            <a:srgbClr val="1D8900">
+              <a:alpha val="9804"/>
+            </a:srgbClr>
+          </a:solidFill>
           <a:ln w="12700">
-            <a:solidFill>
-              <a:srgbClr val="DF3312"/>
-            </a:solidFill>
+            <a:noFill/>
+            <a:prstDash val="dash"/>
           </a:ln>
         </p:spPr>
         <p:style>
@@ -3437,7 +3472,7 @@
           </a:fontRef>
         </p:style>
         <p:txBody>
-          <a:bodyPr tIns="91440" anchorCtr="1"/>
+          <a:bodyPr lIns="502920"/>
           <a:lstStyle/>
           <a:p>
             <a:pPr>
@@ -3446,22 +3481,22 @@
             <a:r>
               <a:rPr lang="en-US" sz="1200" dirty="0">
                 <a:solidFill>
-                  <a:srgbClr val="DF3312"/>
+                  <a:srgbClr val="1E8900"/>
                 </a:solidFill>
                 <a:latin typeface="Arial" panose="020B0604020202020204" pitchFamily="34" charset="0"/>
                 <a:cs typeface="Arial" panose="020B0604020202020204" pitchFamily="34" charset="0"/>
               </a:rPr>
-              <a:t>Bastion security group</a:t>
-            </a:r>
-          </a:p>
-        </p:txBody>
-      </p:sp>
-      <p:sp>
-        <p:nvSpPr>
-          <p:cNvPr id="49" name="Rectangle 48">
+              <a:t>Public subnet</a:t>
+            </a:r>
+          </a:p>
+        </p:txBody>
+      </p:sp>
+      <p:sp>
+        <p:nvSpPr>
+          <p:cNvPr id="48" name="Rectangle 47">
             <a:extLst>
               <a:ext uri="{FF2B5EF4-FFF2-40B4-BE49-F238E27FC236}">
-                <a16:creationId xmlns:a16="http://schemas.microsoft.com/office/drawing/2014/main" id="{BE312AAE-AB35-B441-9CDE-1A1533381BEA}"/>
+                <a16:creationId xmlns:a16="http://schemas.microsoft.com/office/drawing/2014/main" id="{3DB0534F-BDB6-E134-6921-F078B2C23C02}"/>
               </a:ext>
             </a:extLst>
           </p:cNvPr>
@@ -3470,20 +3505,17 @@
         </p:nvSpPr>
         <p:spPr>
           <a:xfrm>
-            <a:off x="2120898" y="2570846"/>
-            <a:ext cx="1925636" cy="5391623"/>
+            <a:off x="2261675" y="1532771"/>
+            <a:ext cx="6049868" cy="786324"/>
           </a:xfrm>
           <a:prstGeom prst="rect">
             <a:avLst/>
           </a:prstGeom>
-          <a:solidFill>
-            <a:srgbClr val="007CBC">
-              <a:alpha val="9804"/>
-            </a:srgbClr>
-          </a:solidFill>
+          <a:noFill/>
           <a:ln w="12700">
-            <a:noFill/>
-            <a:prstDash val="dash"/>
+            <a:solidFill>
+              <a:srgbClr val="DF3312"/>
+            </a:solidFill>
           </a:ln>
         </p:spPr>
         <p:style>
@@ -3503,7 +3535,7 @@
           </a:fontRef>
         </p:style>
         <p:txBody>
-          <a:bodyPr lIns="502920"/>
+          <a:bodyPr tIns="91440" anchorCtr="1"/>
           <a:lstStyle/>
           <a:p>
             <a:pPr>
@@ -3512,281 +3544,44 @@
             <a:r>
               <a:rPr lang="en-US" sz="1200" dirty="0">
                 <a:solidFill>
-                  <a:srgbClr val="5B9CD5"/>
+                  <a:srgbClr val="DF3312"/>
                 </a:solidFill>
                 <a:latin typeface="Arial" panose="020B0604020202020204" pitchFamily="34" charset="0"/>
                 <a:cs typeface="Arial" panose="020B0604020202020204" pitchFamily="34" charset="0"/>
               </a:rPr>
-              <a:t>Private subnet</a:t>
-            </a:r>
-          </a:p>
-        </p:txBody>
-      </p:sp>
-      <p:pic>
-        <p:nvPicPr>
-          <p:cNvPr id="52" name="Graphic 60">
+              <a:t>Bastion security group</a:t>
+            </a:r>
+          </a:p>
+        </p:txBody>
+      </p:sp>
+      <p:sp>
+        <p:nvSpPr>
+          <p:cNvPr id="49" name="Rectangle 48">
             <a:extLst>
               <a:ext uri="{FF2B5EF4-FFF2-40B4-BE49-F238E27FC236}">
-                <a16:creationId xmlns:a16="http://schemas.microsoft.com/office/drawing/2014/main" id="{CA7C0C26-3689-B8D3-0C4E-D9DA2FEBFAAD}"/>
+                <a16:creationId xmlns:a16="http://schemas.microsoft.com/office/drawing/2014/main" id="{BE312AAE-AB35-B441-9CDE-1A1533381BEA}"/>
               </a:ext>
             </a:extLst>
           </p:cNvPr>
-          <p:cNvPicPr>
-            <a:picLocks noChangeAspect="1" noChangeArrowheads="1"/>
-          </p:cNvPicPr>
+          <p:cNvSpPr/>
           <p:nvPr/>
-        </p:nvPicPr>
-        <p:blipFill>
-          <a:blip r:embed="rId4">
-            <a:extLst>
-              <a:ext uri="{28A0092B-C50C-407E-A947-70E740481C1C}">
-                <a14:useLocalDpi xmlns:a14="http://schemas.microsoft.com/office/drawing/2010/main" val="0"/>
-              </a:ext>
-            </a:extLst>
-          </a:blip>
-          <a:srcRect/>
-          <a:stretch>
-            <a:fillRect/>
-          </a:stretch>
-        </p:blipFill>
-        <p:spPr bwMode="auto">
-          <a:xfrm>
-            <a:off x="2843615" y="1629129"/>
-            <a:ext cx="457200" cy="457200"/>
+        </p:nvSpPr>
+        <p:spPr>
+          <a:xfrm>
+            <a:off x="2120898" y="2570846"/>
+            <a:ext cx="1925636" cy="5391623"/>
           </a:xfrm>
           <a:prstGeom prst="rect">
             <a:avLst/>
           </a:prstGeom>
-          <a:noFill/>
-          <a:ln>
+          <a:solidFill>
+            <a:srgbClr val="007CBC">
+              <a:alpha val="9804"/>
+            </a:srgbClr>
+          </a:solidFill>
+          <a:ln w="12700">
             <a:noFill/>
-          </a:ln>
-          <a:extLst>
-            <a:ext uri="{909E8E84-426E-40DD-AFC4-6F175D3DCCD1}">
-              <a14:hiddenFill xmlns:a14="http://schemas.microsoft.com/office/drawing/2010/main">
-                <a:solidFill>
-                  <a:srgbClr val="FFFFFF"/>
-                </a:solidFill>
-              </a14:hiddenFill>
-            </a:ext>
-            <a:ext uri="{91240B29-F687-4F45-9708-019B960494DF}">
-              <a14:hiddenLine xmlns:a14="http://schemas.microsoft.com/office/drawing/2010/main" w="9525">
-                <a:solidFill>
-                  <a:srgbClr val="000000"/>
-                </a:solidFill>
-                <a:miter lim="800000"/>
-                <a:headEnd/>
-                <a:tailEnd/>
-              </a14:hiddenLine>
-            </a:ext>
-          </a:extLst>
-        </p:spPr>
-      </p:pic>
-      <p:pic>
-        <p:nvPicPr>
-          <p:cNvPr id="53" name="Graphic 62">
-            <a:extLst>
-              <a:ext uri="{FF2B5EF4-FFF2-40B4-BE49-F238E27FC236}">
-                <a16:creationId xmlns:a16="http://schemas.microsoft.com/office/drawing/2014/main" id="{5C051477-D3E2-B3C6-B2E3-24E76DC863DD}"/>
-              </a:ext>
-            </a:extLst>
-          </p:cNvPr>
-          <p:cNvPicPr>
-            <a:picLocks noChangeAspect="1" noChangeArrowheads="1"/>
-          </p:cNvPicPr>
-          <p:nvPr/>
-        </p:nvPicPr>
-        <p:blipFill>
-          <a:blip r:embed="rId5">
-            <a:extLst>
-              <a:ext uri="{28A0092B-C50C-407E-A947-70E740481C1C}">
-                <a14:useLocalDpi xmlns:a14="http://schemas.microsoft.com/office/drawing/2010/main" val="0"/>
-              </a:ext>
-            </a:extLst>
-          </a:blip>
-          <a:srcRect/>
-          <a:stretch>
-            <a:fillRect/>
-          </a:stretch>
-        </p:blipFill>
-        <p:spPr bwMode="auto">
-          <a:xfrm>
-            <a:off x="2891917" y="4257881"/>
-            <a:ext cx="457200" cy="457200"/>
-          </a:xfrm>
-          <a:prstGeom prst="rect">
-            <a:avLst/>
-          </a:prstGeom>
-          <a:noFill/>
-          <a:ln>
-            <a:noFill/>
-          </a:ln>
-          <a:extLst>
-            <a:ext uri="{909E8E84-426E-40DD-AFC4-6F175D3DCCD1}">
-              <a14:hiddenFill xmlns:a14="http://schemas.microsoft.com/office/drawing/2010/main">
-                <a:solidFill>
-                  <a:srgbClr val="FFFFFF"/>
-                </a:solidFill>
-              </a14:hiddenFill>
-            </a:ext>
-            <a:ext uri="{91240B29-F687-4F45-9708-019B960494DF}">
-              <a14:hiddenLine xmlns:a14="http://schemas.microsoft.com/office/drawing/2010/main" w="9525">
-                <a:solidFill>
-                  <a:srgbClr val="000000"/>
-                </a:solidFill>
-                <a:miter lim="800000"/>
-                <a:headEnd/>
-                <a:tailEnd/>
-              </a14:hiddenLine>
-            </a:ext>
-          </a:extLst>
-        </p:spPr>
-      </p:pic>
-      <p:pic>
-        <p:nvPicPr>
-          <p:cNvPr id="54" name="Graphic 62">
-            <a:extLst>
-              <a:ext uri="{FF2B5EF4-FFF2-40B4-BE49-F238E27FC236}">
-                <a16:creationId xmlns:a16="http://schemas.microsoft.com/office/drawing/2014/main" id="{68533976-5F61-682A-9ACD-0AEEA8F51E80}"/>
-              </a:ext>
-            </a:extLst>
-          </p:cNvPr>
-          <p:cNvPicPr>
-            <a:picLocks noChangeAspect="1" noChangeArrowheads="1"/>
-          </p:cNvPicPr>
-          <p:nvPr/>
-        </p:nvPicPr>
-        <p:blipFill>
-          <a:blip r:embed="rId5">
-            <a:extLst>
-              <a:ext uri="{28A0092B-C50C-407E-A947-70E740481C1C}">
-                <a14:useLocalDpi xmlns:a14="http://schemas.microsoft.com/office/drawing/2010/main" val="0"/>
-              </a:ext>
-            </a:extLst>
-          </a:blip>
-          <a:srcRect/>
-          <a:stretch>
-            <a:fillRect/>
-          </a:stretch>
-        </p:blipFill>
-        <p:spPr bwMode="auto">
-          <a:xfrm>
-            <a:off x="2875674" y="6310844"/>
-            <a:ext cx="457200" cy="457200"/>
-          </a:xfrm>
-          <a:prstGeom prst="rect">
-            <a:avLst/>
-          </a:prstGeom>
-          <a:noFill/>
-          <a:ln>
-            <a:noFill/>
-          </a:ln>
-          <a:extLst>
-            <a:ext uri="{909E8E84-426E-40DD-AFC4-6F175D3DCCD1}">
-              <a14:hiddenFill xmlns:a14="http://schemas.microsoft.com/office/drawing/2010/main">
-                <a:solidFill>
-                  <a:srgbClr val="FFFFFF"/>
-                </a:solidFill>
-              </a14:hiddenFill>
-            </a:ext>
-            <a:ext uri="{91240B29-F687-4F45-9708-019B960494DF}">
-              <a14:hiddenLine xmlns:a14="http://schemas.microsoft.com/office/drawing/2010/main" w="9525">
-                <a:solidFill>
-                  <a:srgbClr val="000000"/>
-                </a:solidFill>
-                <a:miter lim="800000"/>
-                <a:headEnd/>
-                <a:tailEnd/>
-              </a14:hiddenLine>
-            </a:ext>
-          </a:extLst>
-        </p:spPr>
-      </p:pic>
-      <p:pic>
-        <p:nvPicPr>
-          <p:cNvPr id="55" name="Graphic 37">
-            <a:extLst>
-              <a:ext uri="{FF2B5EF4-FFF2-40B4-BE49-F238E27FC236}">
-                <a16:creationId xmlns:a16="http://schemas.microsoft.com/office/drawing/2014/main" id="{0448B123-BAA1-F128-9172-93B21E21369F}"/>
-              </a:ext>
-            </a:extLst>
-          </p:cNvPr>
-          <p:cNvPicPr>
-            <a:picLocks noChangeAspect="1" noChangeArrowheads="1"/>
-          </p:cNvPicPr>
-          <p:nvPr/>
-        </p:nvPicPr>
-        <p:blipFill>
-          <a:blip r:embed="rId6">
-            <a:extLst>
-              <a:ext uri="{28A0092B-C50C-407E-A947-70E740481C1C}">
-                <a14:useLocalDpi xmlns:a14="http://schemas.microsoft.com/office/drawing/2010/main" val="0"/>
-              </a:ext>
-            </a:extLst>
-          </a:blip>
-          <a:srcRect/>
-          <a:stretch>
-            <a:fillRect/>
-          </a:stretch>
-        </p:blipFill>
-        <p:spPr bwMode="auto">
-          <a:xfrm>
-            <a:off x="2881659" y="7305145"/>
-            <a:ext cx="457200" cy="457200"/>
-          </a:xfrm>
-          <a:prstGeom prst="rect">
-            <a:avLst/>
-          </a:prstGeom>
-          <a:noFill/>
-          <a:ln>
-            <a:noFill/>
-          </a:ln>
-          <a:extLst>
-            <a:ext uri="{909E8E84-426E-40DD-AFC4-6F175D3DCCD1}">
-              <a14:hiddenFill xmlns:a14="http://schemas.microsoft.com/office/drawing/2010/main">
-                <a:solidFill>
-                  <a:srgbClr val="FFFFFF"/>
-                </a:solidFill>
-              </a14:hiddenFill>
-            </a:ext>
-            <a:ext uri="{91240B29-F687-4F45-9708-019B960494DF}">
-              <a14:hiddenLine xmlns:a14="http://schemas.microsoft.com/office/drawing/2010/main" w="9525">
-                <a:solidFill>
-                  <a:srgbClr val="000000"/>
-                </a:solidFill>
-                <a:miter lim="800000"/>
-                <a:headEnd/>
-                <a:tailEnd/>
-              </a14:hiddenLine>
-            </a:ext>
-          </a:extLst>
-        </p:spPr>
-      </p:pic>
-      <p:sp>
-        <p:nvSpPr>
-          <p:cNvPr id="56" name="Rectangle 55">
-            <a:extLst>
-              <a:ext uri="{FF2B5EF4-FFF2-40B4-BE49-F238E27FC236}">
-                <a16:creationId xmlns:a16="http://schemas.microsoft.com/office/drawing/2014/main" id="{BE69FFBF-A605-4739-E782-C47C872E3629}"/>
-              </a:ext>
-            </a:extLst>
-          </p:cNvPr>
-          <p:cNvSpPr/>
-          <p:nvPr/>
-        </p:nvSpPr>
-        <p:spPr>
-          <a:xfrm>
-            <a:off x="2253224" y="3070183"/>
-            <a:ext cx="6010034" cy="1941137"/>
-          </a:xfrm>
-          <a:prstGeom prst="rect">
-            <a:avLst/>
-          </a:prstGeom>
-          <a:noFill/>
-          <a:ln w="12700">
-            <a:solidFill>
-              <a:srgbClr val="DF3312"/>
-            </a:solidFill>
+            <a:prstDash val="dash"/>
           </a:ln>
         </p:spPr>
         <p:style>
@@ -3806,7 +3601,7 @@
           </a:fontRef>
         </p:style>
         <p:txBody>
-          <a:bodyPr tIns="91440" anchorCtr="1"/>
+          <a:bodyPr lIns="502920"/>
           <a:lstStyle/>
           <a:p>
             <a:pPr>
@@ -3815,22 +3610,262 @@
             <a:r>
               <a:rPr lang="en-US" sz="1200" dirty="0">
                 <a:solidFill>
-                  <a:srgbClr val="DF3312"/>
+                  <a:srgbClr val="5B9CD5"/>
                 </a:solidFill>
                 <a:latin typeface="Arial" panose="020B0604020202020204" pitchFamily="34" charset="0"/>
                 <a:cs typeface="Arial" panose="020B0604020202020204" pitchFamily="34" charset="0"/>
               </a:rPr>
-              <a:t>Worker nodes security group</a:t>
-            </a:r>
-          </a:p>
-        </p:txBody>
-      </p:sp>
-      <p:sp>
-        <p:nvSpPr>
-          <p:cNvPr id="59" name="Rectangle 58">
+              <a:t>Private subnet</a:t>
+            </a:r>
+          </a:p>
+        </p:txBody>
+      </p:sp>
+      <p:pic>
+        <p:nvPicPr>
+          <p:cNvPr id="52" name="Graphic 60">
             <a:extLst>
               <a:ext uri="{FF2B5EF4-FFF2-40B4-BE49-F238E27FC236}">
-                <a16:creationId xmlns:a16="http://schemas.microsoft.com/office/drawing/2014/main" id="{CE1A16E0-727B-121C-BBBD-8575F8CC3658}"/>
+                <a16:creationId xmlns:a16="http://schemas.microsoft.com/office/drawing/2014/main" id="{CA7C0C26-3689-B8D3-0C4E-D9DA2FEBFAAD}"/>
+              </a:ext>
+            </a:extLst>
+          </p:cNvPr>
+          <p:cNvPicPr>
+            <a:picLocks noChangeAspect="1" noChangeArrowheads="1"/>
+          </p:cNvPicPr>
+          <p:nvPr/>
+        </p:nvPicPr>
+        <p:blipFill>
+          <a:blip r:embed="rId4">
+            <a:extLst>
+              <a:ext uri="{28A0092B-C50C-407E-A947-70E740481C1C}">
+                <a14:useLocalDpi xmlns:a14="http://schemas.microsoft.com/office/drawing/2010/main" val="0"/>
+              </a:ext>
+            </a:extLst>
+          </a:blip>
+          <a:srcRect/>
+          <a:stretch>
+            <a:fillRect/>
+          </a:stretch>
+        </p:blipFill>
+        <p:spPr bwMode="auto">
+          <a:xfrm>
+            <a:off x="2843615" y="1629129"/>
+            <a:ext cx="457200" cy="457200"/>
+          </a:xfrm>
+          <a:prstGeom prst="rect">
+            <a:avLst/>
+          </a:prstGeom>
+          <a:noFill/>
+          <a:ln>
+            <a:noFill/>
+          </a:ln>
+          <a:extLst>
+            <a:ext uri="{909E8E84-426E-40DD-AFC4-6F175D3DCCD1}">
+              <a14:hiddenFill xmlns:a14="http://schemas.microsoft.com/office/drawing/2010/main">
+                <a:solidFill>
+                  <a:srgbClr val="FFFFFF"/>
+                </a:solidFill>
+              </a14:hiddenFill>
+            </a:ext>
+            <a:ext uri="{91240B29-F687-4F45-9708-019B960494DF}">
+              <a14:hiddenLine xmlns:a14="http://schemas.microsoft.com/office/drawing/2010/main" w="9525">
+                <a:solidFill>
+                  <a:srgbClr val="000000"/>
+                </a:solidFill>
+                <a:miter lim="800000"/>
+                <a:headEnd/>
+                <a:tailEnd/>
+              </a14:hiddenLine>
+            </a:ext>
+          </a:extLst>
+        </p:spPr>
+      </p:pic>
+      <p:pic>
+        <p:nvPicPr>
+          <p:cNvPr id="53" name="Graphic 62">
+            <a:extLst>
+              <a:ext uri="{FF2B5EF4-FFF2-40B4-BE49-F238E27FC236}">
+                <a16:creationId xmlns:a16="http://schemas.microsoft.com/office/drawing/2014/main" id="{5C051477-D3E2-B3C6-B2E3-24E76DC863DD}"/>
+              </a:ext>
+            </a:extLst>
+          </p:cNvPr>
+          <p:cNvPicPr>
+            <a:picLocks noChangeAspect="1" noChangeArrowheads="1"/>
+          </p:cNvPicPr>
+          <p:nvPr/>
+        </p:nvPicPr>
+        <p:blipFill>
+          <a:blip r:embed="rId5">
+            <a:extLst>
+              <a:ext uri="{28A0092B-C50C-407E-A947-70E740481C1C}">
+                <a14:useLocalDpi xmlns:a14="http://schemas.microsoft.com/office/drawing/2010/main" val="0"/>
+              </a:ext>
+            </a:extLst>
+          </a:blip>
+          <a:srcRect/>
+          <a:stretch>
+            <a:fillRect/>
+          </a:stretch>
+        </p:blipFill>
+        <p:spPr bwMode="auto">
+          <a:xfrm>
+            <a:off x="2891917" y="4257881"/>
+            <a:ext cx="457200" cy="457200"/>
+          </a:xfrm>
+          <a:prstGeom prst="rect">
+            <a:avLst/>
+          </a:prstGeom>
+          <a:noFill/>
+          <a:ln>
+            <a:noFill/>
+          </a:ln>
+          <a:extLst>
+            <a:ext uri="{909E8E84-426E-40DD-AFC4-6F175D3DCCD1}">
+              <a14:hiddenFill xmlns:a14="http://schemas.microsoft.com/office/drawing/2010/main">
+                <a:solidFill>
+                  <a:srgbClr val="FFFFFF"/>
+                </a:solidFill>
+              </a14:hiddenFill>
+            </a:ext>
+            <a:ext uri="{91240B29-F687-4F45-9708-019B960494DF}">
+              <a14:hiddenLine xmlns:a14="http://schemas.microsoft.com/office/drawing/2010/main" w="9525">
+                <a:solidFill>
+                  <a:srgbClr val="000000"/>
+                </a:solidFill>
+                <a:miter lim="800000"/>
+                <a:headEnd/>
+                <a:tailEnd/>
+              </a14:hiddenLine>
+            </a:ext>
+          </a:extLst>
+        </p:spPr>
+      </p:pic>
+      <p:pic>
+        <p:nvPicPr>
+          <p:cNvPr id="54" name="Graphic 62">
+            <a:extLst>
+              <a:ext uri="{FF2B5EF4-FFF2-40B4-BE49-F238E27FC236}">
+                <a16:creationId xmlns:a16="http://schemas.microsoft.com/office/drawing/2014/main" id="{68533976-5F61-682A-9ACD-0AEEA8F51E80}"/>
+              </a:ext>
+            </a:extLst>
+          </p:cNvPr>
+          <p:cNvPicPr>
+            <a:picLocks noChangeAspect="1" noChangeArrowheads="1"/>
+          </p:cNvPicPr>
+          <p:nvPr/>
+        </p:nvPicPr>
+        <p:blipFill>
+          <a:blip r:embed="rId5">
+            <a:extLst>
+              <a:ext uri="{28A0092B-C50C-407E-A947-70E740481C1C}">
+                <a14:useLocalDpi xmlns:a14="http://schemas.microsoft.com/office/drawing/2010/main" val="0"/>
+              </a:ext>
+            </a:extLst>
+          </a:blip>
+          <a:srcRect/>
+          <a:stretch>
+            <a:fillRect/>
+          </a:stretch>
+        </p:blipFill>
+        <p:spPr bwMode="auto">
+          <a:xfrm>
+            <a:off x="2875674" y="6339419"/>
+            <a:ext cx="457200" cy="457200"/>
+          </a:xfrm>
+          <a:prstGeom prst="rect">
+            <a:avLst/>
+          </a:prstGeom>
+          <a:noFill/>
+          <a:ln>
+            <a:noFill/>
+          </a:ln>
+          <a:extLst>
+            <a:ext uri="{909E8E84-426E-40DD-AFC4-6F175D3DCCD1}">
+              <a14:hiddenFill xmlns:a14="http://schemas.microsoft.com/office/drawing/2010/main">
+                <a:solidFill>
+                  <a:srgbClr val="FFFFFF"/>
+                </a:solidFill>
+              </a14:hiddenFill>
+            </a:ext>
+            <a:ext uri="{91240B29-F687-4F45-9708-019B960494DF}">
+              <a14:hiddenLine xmlns:a14="http://schemas.microsoft.com/office/drawing/2010/main" w="9525">
+                <a:solidFill>
+                  <a:srgbClr val="000000"/>
+                </a:solidFill>
+                <a:miter lim="800000"/>
+                <a:headEnd/>
+                <a:tailEnd/>
+              </a14:hiddenLine>
+            </a:ext>
+          </a:extLst>
+        </p:spPr>
+      </p:pic>
+      <p:pic>
+        <p:nvPicPr>
+          <p:cNvPr id="55" name="Graphic 37">
+            <a:extLst>
+              <a:ext uri="{FF2B5EF4-FFF2-40B4-BE49-F238E27FC236}">
+                <a16:creationId xmlns:a16="http://schemas.microsoft.com/office/drawing/2014/main" id="{0448B123-BAA1-F128-9172-93B21E21369F}"/>
+              </a:ext>
+            </a:extLst>
+          </p:cNvPr>
+          <p:cNvPicPr>
+            <a:picLocks noChangeAspect="1" noChangeArrowheads="1"/>
+          </p:cNvPicPr>
+          <p:nvPr/>
+        </p:nvPicPr>
+        <p:blipFill>
+          <a:blip r:embed="rId6">
+            <a:extLst>
+              <a:ext uri="{28A0092B-C50C-407E-A947-70E740481C1C}">
+                <a14:useLocalDpi xmlns:a14="http://schemas.microsoft.com/office/drawing/2010/main" val="0"/>
+              </a:ext>
+            </a:extLst>
+          </a:blip>
+          <a:srcRect/>
+          <a:stretch>
+            <a:fillRect/>
+          </a:stretch>
+        </p:blipFill>
+        <p:spPr bwMode="auto">
+          <a:xfrm>
+            <a:off x="2881659" y="7305145"/>
+            <a:ext cx="457200" cy="457200"/>
+          </a:xfrm>
+          <a:prstGeom prst="rect">
+            <a:avLst/>
+          </a:prstGeom>
+          <a:noFill/>
+          <a:ln>
+            <a:noFill/>
+          </a:ln>
+          <a:extLst>
+            <a:ext uri="{909E8E84-426E-40DD-AFC4-6F175D3DCCD1}">
+              <a14:hiddenFill xmlns:a14="http://schemas.microsoft.com/office/drawing/2010/main">
+                <a:solidFill>
+                  <a:srgbClr val="FFFFFF"/>
+                </a:solidFill>
+              </a14:hiddenFill>
+            </a:ext>
+            <a:ext uri="{91240B29-F687-4F45-9708-019B960494DF}">
+              <a14:hiddenLine xmlns:a14="http://schemas.microsoft.com/office/drawing/2010/main" w="9525">
+                <a:solidFill>
+                  <a:srgbClr val="000000"/>
+                </a:solidFill>
+                <a:miter lim="800000"/>
+                <a:headEnd/>
+                <a:tailEnd/>
+              </a14:hiddenLine>
+            </a:ext>
+          </a:extLst>
+        </p:spPr>
+      </p:pic>
+      <p:sp>
+        <p:nvSpPr>
+          <p:cNvPr id="56" name="Rectangle 55">
+            <a:extLst>
+              <a:ext uri="{FF2B5EF4-FFF2-40B4-BE49-F238E27FC236}">
+                <a16:creationId xmlns:a16="http://schemas.microsoft.com/office/drawing/2014/main" id="{BE69FFBF-A605-4739-E782-C47C872E3629}"/>
               </a:ext>
             </a:extLst>
           </p:cNvPr>
@@ -3839,8 +3874,8 @@
         </p:nvSpPr>
         <p:spPr>
           <a:xfrm>
-            <a:off x="2261675" y="7245661"/>
-            <a:ext cx="5997802" cy="607490"/>
+            <a:off x="2253223" y="3070183"/>
+            <a:ext cx="6062101" cy="1975106"/>
           </a:xfrm>
           <a:prstGeom prst="rect">
             <a:avLst/>
@@ -3872,7 +3907,7 @@
           <a:bodyPr tIns="91440" anchorCtr="1"/>
           <a:lstStyle/>
           <a:p>
-            <a:pPr algn="ctr">
+            <a:pPr>
               <a:defRPr/>
             </a:pPr>
             <a:r>
@@ -3883,17 +3918,17 @@
                 <a:latin typeface="Arial" panose="020B0604020202020204" pitchFamily="34" charset="0"/>
                 <a:cs typeface="Arial" panose="020B0604020202020204" pitchFamily="34" charset="0"/>
               </a:rPr>
-              <a:t>Database security group</a:t>
-            </a:r>
-          </a:p>
-        </p:txBody>
-      </p:sp>
-      <p:sp>
-        <p:nvSpPr>
-          <p:cNvPr id="60" name="Rectangle 59">
+              <a:t>Worker nodes security group</a:t>
+            </a:r>
+          </a:p>
+        </p:txBody>
+      </p:sp>
+      <p:sp>
+        <p:nvSpPr>
+          <p:cNvPr id="59" name="Rectangle 58">
             <a:extLst>
               <a:ext uri="{FF2B5EF4-FFF2-40B4-BE49-F238E27FC236}">
-                <a16:creationId xmlns:a16="http://schemas.microsoft.com/office/drawing/2014/main" id="{7680AA70-6AFE-02DC-0713-3393EC90B6D1}"/>
+                <a16:creationId xmlns:a16="http://schemas.microsoft.com/office/drawing/2014/main" id="{CE1A16E0-727B-121C-BBBD-8575F8CC3658}"/>
               </a:ext>
             </a:extLst>
           </p:cNvPr>
@@ -3902,8 +3937,8 @@
         </p:nvSpPr>
         <p:spPr>
           <a:xfrm>
-            <a:off x="2249444" y="5154858"/>
-            <a:ext cx="6010034" cy="1941137"/>
+            <a:off x="2261675" y="7245661"/>
+            <a:ext cx="5997802" cy="607490"/>
           </a:xfrm>
           <a:prstGeom prst="rect">
             <a:avLst/>
@@ -3935,7 +3970,7 @@
           <a:bodyPr tIns="91440" anchorCtr="1"/>
           <a:lstStyle/>
           <a:p>
-            <a:pPr>
+            <a:pPr algn="ctr">
               <a:defRPr/>
             </a:pPr>
             <a:r>
@@ -3946,173 +3981,17 @@
                 <a:latin typeface="Arial" panose="020B0604020202020204" pitchFamily="34" charset="0"/>
                 <a:cs typeface="Arial" panose="020B0604020202020204" pitchFamily="34" charset="0"/>
               </a:rPr>
-              <a:t>Control plane security group</a:t>
-            </a:r>
-          </a:p>
-        </p:txBody>
-      </p:sp>
-      <p:sp>
-        <p:nvSpPr>
-          <p:cNvPr id="62" name="TextBox 61">
+              <a:t>Database security group</a:t>
+            </a:r>
+          </a:p>
+        </p:txBody>
+      </p:sp>
+      <p:sp>
+        <p:nvSpPr>
+          <p:cNvPr id="60" name="Rectangle 59">
             <a:extLst>
               <a:ext uri="{FF2B5EF4-FFF2-40B4-BE49-F238E27FC236}">
-                <a16:creationId xmlns:a16="http://schemas.microsoft.com/office/drawing/2014/main" id="{9CCB00AE-66E3-556B-367B-933E6A37CB5C}"/>
-              </a:ext>
-            </a:extLst>
-          </p:cNvPr>
-          <p:cNvSpPr txBox="1"/>
-          <p:nvPr/>
-        </p:nvSpPr>
-        <p:spPr>
-          <a:xfrm>
-            <a:off x="2503200" y="6727715"/>
-            <a:ext cx="1234633" cy="261610"/>
-          </a:xfrm>
-          <a:prstGeom prst="rect">
-            <a:avLst/>
-          </a:prstGeom>
-          <a:noFill/>
-        </p:spPr>
-        <p:txBody>
-          <a:bodyPr wrap="none" rtlCol="0">
-            <a:spAutoFit/>
-          </a:bodyPr>
-          <a:lstStyle/>
-          <a:p>
-            <a:pPr algn="ctr"/>
-            <a:r>
-              <a:rPr lang="en-US" sz="1100" dirty="0">
-                <a:latin typeface="Arial" panose="020B0604020202020204" pitchFamily="34" charset="0"/>
-                <a:cs typeface="Arial" panose="020B0604020202020204" pitchFamily="34" charset="0"/>
-              </a:rPr>
-              <a:t>Server instances</a:t>
-            </a:r>
-          </a:p>
-        </p:txBody>
-      </p:sp>
-      <p:sp>
-        <p:nvSpPr>
-          <p:cNvPr id="63" name="TextBox 62">
-            <a:extLst>
-              <a:ext uri="{FF2B5EF4-FFF2-40B4-BE49-F238E27FC236}">
-                <a16:creationId xmlns:a16="http://schemas.microsoft.com/office/drawing/2014/main" id="{E5A0121D-384D-294B-8E41-6020BEC93C71}"/>
-              </a:ext>
-            </a:extLst>
-          </p:cNvPr>
-          <p:cNvSpPr txBox="1"/>
-          <p:nvPr/>
-        </p:nvSpPr>
-        <p:spPr>
-          <a:xfrm>
-            <a:off x="2517347" y="4675880"/>
-            <a:ext cx="1188146" cy="261610"/>
-          </a:xfrm>
-          <a:prstGeom prst="rect">
-            <a:avLst/>
-          </a:prstGeom>
-          <a:noFill/>
-        </p:spPr>
-        <p:txBody>
-          <a:bodyPr wrap="none" rtlCol="0">
-            <a:spAutoFit/>
-          </a:bodyPr>
-          <a:lstStyle/>
-          <a:p>
-            <a:pPr algn="ctr"/>
-            <a:r>
-              <a:rPr lang="en-US" sz="1100" dirty="0">
-                <a:latin typeface="Arial" panose="020B0604020202020204" pitchFamily="34" charset="0"/>
-                <a:cs typeface="Arial" panose="020B0604020202020204" pitchFamily="34" charset="0"/>
-              </a:rPr>
-              <a:t>Agent instances</a:t>
-            </a:r>
-          </a:p>
-        </p:txBody>
-      </p:sp>
-      <p:sp>
-        <p:nvSpPr>
-          <p:cNvPr id="66" name="TextBox 65">
-            <a:extLst>
-              <a:ext uri="{FF2B5EF4-FFF2-40B4-BE49-F238E27FC236}">
-                <a16:creationId xmlns:a16="http://schemas.microsoft.com/office/drawing/2014/main" id="{ADF9C706-903F-21B8-5370-7193F64392BF}"/>
-              </a:ext>
-            </a:extLst>
-          </p:cNvPr>
-          <p:cNvSpPr txBox="1"/>
-          <p:nvPr/>
-        </p:nvSpPr>
-        <p:spPr>
-          <a:xfrm>
-            <a:off x="2606975" y="2057485"/>
-            <a:ext cx="960520" cy="261610"/>
-          </a:xfrm>
-          <a:prstGeom prst="rect">
-            <a:avLst/>
-          </a:prstGeom>
-          <a:noFill/>
-        </p:spPr>
-        <p:txBody>
-          <a:bodyPr wrap="none" rtlCol="0">
-            <a:spAutoFit/>
-          </a:bodyPr>
-          <a:lstStyle/>
-          <a:p>
-            <a:pPr algn="ctr"/>
-            <a:r>
-              <a:rPr lang="en-US" sz="1100" dirty="0">
-                <a:latin typeface="Arial" panose="020B0604020202020204" pitchFamily="34" charset="0"/>
-                <a:cs typeface="Arial" panose="020B0604020202020204" pitchFamily="34" charset="0"/>
-              </a:rPr>
-              <a:t>Bastion host</a:t>
-            </a:r>
-          </a:p>
-        </p:txBody>
-      </p:sp>
-      <p:sp>
-        <p:nvSpPr>
-          <p:cNvPr id="69" name="TextBox 68">
-            <a:extLst>
-              <a:ext uri="{FF2B5EF4-FFF2-40B4-BE49-F238E27FC236}">
-                <a16:creationId xmlns:a16="http://schemas.microsoft.com/office/drawing/2014/main" id="{93D199E9-1170-3772-E7D8-3A11CB333D0C}"/>
-              </a:ext>
-            </a:extLst>
-          </p:cNvPr>
-          <p:cNvSpPr txBox="1"/>
-          <p:nvPr/>
-        </p:nvSpPr>
-        <p:spPr>
-          <a:xfrm>
-            <a:off x="4394586" y="5903427"/>
-            <a:ext cx="1651414" cy="261610"/>
-          </a:xfrm>
-          <a:prstGeom prst="rect">
-            <a:avLst/>
-          </a:prstGeom>
-          <a:noFill/>
-        </p:spPr>
-        <p:txBody>
-          <a:bodyPr wrap="none" rtlCol="0">
-            <a:spAutoFit/>
-          </a:bodyPr>
-          <a:lstStyle/>
-          <a:p>
-            <a:pPr algn="ctr"/>
-            <a:r>
-              <a:rPr lang="en-US" sz="1100" dirty="0">
-                <a:latin typeface="Arial" panose="020B0604020202020204" pitchFamily="34" charset="0"/>
-                <a:cs typeface="Arial" panose="020B0604020202020204" pitchFamily="34" charset="0"/>
-              </a:rPr>
-              <a:t>Network Load Balancer</a:t>
-            </a:r>
-          </a:p>
-        </p:txBody>
-      </p:sp>
-      <p:sp>
-        <p:nvSpPr>
-          <p:cNvPr id="70" name="Rectangle 69">
-            <a:extLst>
-              <a:ext uri="{FF2B5EF4-FFF2-40B4-BE49-F238E27FC236}">
-                <a16:creationId xmlns:a16="http://schemas.microsoft.com/office/drawing/2014/main" id="{AE274B17-2D7E-77C6-E37A-9C2E042F2B86}"/>
+                <a16:creationId xmlns:a16="http://schemas.microsoft.com/office/drawing/2014/main" id="{7680AA70-6AFE-02DC-0713-3393EC90B6D1}"/>
               </a:ext>
             </a:extLst>
           </p:cNvPr>
@@ -4121,8 +4000,8 @@
         </p:nvSpPr>
         <p:spPr>
           <a:xfrm>
-            <a:off x="2395394" y="4181226"/>
-            <a:ext cx="5725866" cy="748543"/>
+            <a:off x="2249444" y="5183433"/>
+            <a:ext cx="6062100" cy="1941137"/>
           </a:xfrm>
           <a:prstGeom prst="rect">
             <a:avLst/>
@@ -4130,9 +4009,8 @@
           <a:noFill/>
           <a:ln w="12700">
             <a:solidFill>
-              <a:srgbClr val="D86613"/>
+              <a:srgbClr val="DF3312"/>
             </a:solidFill>
-            <a:prstDash val="dash"/>
           </a:ln>
         </p:spPr>
         <p:style>
@@ -4152,55 +4030,177 @@
           </a:fontRef>
         </p:style>
         <p:txBody>
-          <a:bodyPr tIns="91440"/>
-          <a:lstStyle/>
-          <a:p>
-            <a:pPr algn="ctr">
+          <a:bodyPr tIns="91440" anchorCtr="1"/>
+          <a:lstStyle/>
+          <a:p>
+            <a:pPr>
               <a:defRPr/>
             </a:pPr>
-            <a:endParaRPr lang="en-US" sz="1200" dirty="0">
-              <a:solidFill>
-                <a:srgbClr val="D86613"/>
-              </a:solidFill>
-              <a:latin typeface="Arial" panose="020B0604020202020204" pitchFamily="34" charset="0"/>
-              <a:cs typeface="Arial" panose="020B0604020202020204" pitchFamily="34" charset="0"/>
-            </a:endParaRPr>
-          </a:p>
-          <a:p>
-            <a:pPr algn="ctr">
-              <a:defRPr/>
-            </a:pPr>
-            <a:endParaRPr lang="en-US" sz="1200" dirty="0">
-              <a:solidFill>
-                <a:srgbClr val="D86613"/>
-              </a:solidFill>
-              <a:latin typeface="Arial" panose="020B0604020202020204" pitchFamily="34" charset="0"/>
-              <a:cs typeface="Arial" panose="020B0604020202020204" pitchFamily="34" charset="0"/>
-            </a:endParaRPr>
-          </a:p>
-          <a:p>
-            <a:pPr algn="ctr">
-              <a:defRPr/>
-            </a:pPr>
             <a:r>
               <a:rPr lang="en-US" sz="1200" dirty="0">
                 <a:solidFill>
-                  <a:srgbClr val="D86613"/>
+                  <a:srgbClr val="DF3312"/>
                 </a:solidFill>
                 <a:latin typeface="Arial" panose="020B0604020202020204" pitchFamily="34" charset="0"/>
                 <a:cs typeface="Arial" panose="020B0604020202020204" pitchFamily="34" charset="0"/>
               </a:rPr>
-              <a:t>Auto Scaling </a:t>
-            </a:r>
+              <a:t>Control plane security group</a:t>
+            </a:r>
+          </a:p>
+        </p:txBody>
+      </p:sp>
+      <p:sp>
+        <p:nvSpPr>
+          <p:cNvPr id="62" name="TextBox 61">
+            <a:extLst>
+              <a:ext uri="{FF2B5EF4-FFF2-40B4-BE49-F238E27FC236}">
+                <a16:creationId xmlns:a16="http://schemas.microsoft.com/office/drawing/2014/main" id="{9CCB00AE-66E3-556B-367B-933E6A37CB5C}"/>
+              </a:ext>
+            </a:extLst>
+          </p:cNvPr>
+          <p:cNvSpPr txBox="1"/>
+          <p:nvPr/>
+        </p:nvSpPr>
+        <p:spPr>
+          <a:xfrm>
+            <a:off x="2503200" y="6756290"/>
+            <a:ext cx="1234633" cy="261610"/>
+          </a:xfrm>
+          <a:prstGeom prst="rect">
+            <a:avLst/>
+          </a:prstGeom>
+          <a:noFill/>
+        </p:spPr>
+        <p:txBody>
+          <a:bodyPr wrap="none" rtlCol="0">
+            <a:spAutoFit/>
+          </a:bodyPr>
+          <a:lstStyle/>
+          <a:p>
+            <a:pPr algn="ctr"/>
             <a:r>
               <a:rPr lang="en-US" sz="1100" dirty="0">
-                <a:solidFill>
-                  <a:srgbClr val="D86613"/>
-                </a:solidFill>
                 <a:latin typeface="Arial" panose="020B0604020202020204" pitchFamily="34" charset="0"/>
                 <a:cs typeface="Arial" panose="020B0604020202020204" pitchFamily="34" charset="0"/>
               </a:rPr>
-              <a:t>group</a:t>
+              <a:t>Server instances</a:t>
+            </a:r>
+          </a:p>
+        </p:txBody>
+      </p:sp>
+      <p:sp>
+        <p:nvSpPr>
+          <p:cNvPr id="63" name="TextBox 62">
+            <a:extLst>
+              <a:ext uri="{FF2B5EF4-FFF2-40B4-BE49-F238E27FC236}">
+                <a16:creationId xmlns:a16="http://schemas.microsoft.com/office/drawing/2014/main" id="{E5A0121D-384D-294B-8E41-6020BEC93C71}"/>
+              </a:ext>
+            </a:extLst>
+          </p:cNvPr>
+          <p:cNvSpPr txBox="1"/>
+          <p:nvPr/>
+        </p:nvSpPr>
+        <p:spPr>
+          <a:xfrm>
+            <a:off x="2517347" y="4675880"/>
+            <a:ext cx="1188146" cy="261610"/>
+          </a:xfrm>
+          <a:prstGeom prst="rect">
+            <a:avLst/>
+          </a:prstGeom>
+          <a:noFill/>
+        </p:spPr>
+        <p:txBody>
+          <a:bodyPr wrap="none" rtlCol="0">
+            <a:spAutoFit/>
+          </a:bodyPr>
+          <a:lstStyle/>
+          <a:p>
+            <a:pPr algn="ctr"/>
+            <a:r>
+              <a:rPr lang="en-US" sz="1100" dirty="0">
+                <a:latin typeface="Arial" panose="020B0604020202020204" pitchFamily="34" charset="0"/>
+                <a:cs typeface="Arial" panose="020B0604020202020204" pitchFamily="34" charset="0"/>
+              </a:rPr>
+              <a:t>Agent instances</a:t>
+            </a:r>
+          </a:p>
+        </p:txBody>
+      </p:sp>
+      <p:sp>
+        <p:nvSpPr>
+          <p:cNvPr id="66" name="TextBox 65">
+            <a:extLst>
+              <a:ext uri="{FF2B5EF4-FFF2-40B4-BE49-F238E27FC236}">
+                <a16:creationId xmlns:a16="http://schemas.microsoft.com/office/drawing/2014/main" id="{ADF9C706-903F-21B8-5370-7193F64392BF}"/>
+              </a:ext>
+            </a:extLst>
+          </p:cNvPr>
+          <p:cNvSpPr txBox="1"/>
+          <p:nvPr/>
+        </p:nvSpPr>
+        <p:spPr>
+          <a:xfrm>
+            <a:off x="2606975" y="2057485"/>
+            <a:ext cx="960520" cy="261610"/>
+          </a:xfrm>
+          <a:prstGeom prst="rect">
+            <a:avLst/>
+          </a:prstGeom>
+          <a:noFill/>
+        </p:spPr>
+        <p:txBody>
+          <a:bodyPr wrap="none" rtlCol="0">
+            <a:spAutoFit/>
+          </a:bodyPr>
+          <a:lstStyle/>
+          <a:p>
+            <a:pPr algn="ctr"/>
+            <a:r>
+              <a:rPr lang="en-US" sz="1100" dirty="0">
+                <a:latin typeface="Arial" panose="020B0604020202020204" pitchFamily="34" charset="0"/>
+                <a:cs typeface="Arial" panose="020B0604020202020204" pitchFamily="34" charset="0"/>
+              </a:rPr>
+              <a:t>Bastion host</a:t>
+            </a:r>
+          </a:p>
+        </p:txBody>
+      </p:sp>
+      <p:sp>
+        <p:nvSpPr>
+          <p:cNvPr id="69" name="TextBox 68">
+            <a:extLst>
+              <a:ext uri="{FF2B5EF4-FFF2-40B4-BE49-F238E27FC236}">
+                <a16:creationId xmlns:a16="http://schemas.microsoft.com/office/drawing/2014/main" id="{93D199E9-1170-3772-E7D8-3A11CB333D0C}"/>
+              </a:ext>
+            </a:extLst>
+          </p:cNvPr>
+          <p:cNvSpPr txBox="1"/>
+          <p:nvPr/>
+        </p:nvSpPr>
+        <p:spPr>
+          <a:xfrm>
+            <a:off x="4425186" y="5923334"/>
+            <a:ext cx="1651414" cy="261610"/>
+          </a:xfrm>
+          <a:prstGeom prst="rect">
+            <a:avLst/>
+          </a:prstGeom>
+          <a:noFill/>
+        </p:spPr>
+        <p:txBody>
+          <a:bodyPr wrap="none" rtlCol="0">
+            <a:spAutoFit/>
+          </a:bodyPr>
+          <a:lstStyle/>
+          <a:p>
+            <a:pPr algn="ctr"/>
+            <a:r>
+              <a:rPr lang="en-US" sz="1100" dirty="0">
+                <a:latin typeface="Arial" panose="020B0604020202020204" pitchFamily="34" charset="0"/>
+                <a:cs typeface="Arial" panose="020B0604020202020204" pitchFamily="34" charset="0"/>
+              </a:rPr>
+              <a:t>Network Load Balancer</a:t>
             </a:r>
           </a:p>
         </p:txBody>
@@ -4219,7 +4219,7 @@
         </p:nvSpPr>
         <p:spPr>
           <a:xfrm>
-            <a:off x="2395395" y="6168947"/>
+            <a:off x="2395395" y="6197522"/>
             <a:ext cx="5725865" cy="817479"/>
           </a:xfrm>
           <a:prstGeom prst="rect">
@@ -4497,7 +4497,7 @@
         </p:blipFill>
         <p:spPr bwMode="auto">
           <a:xfrm>
-            <a:off x="7191770" y="6351152"/>
+            <a:off x="7191770" y="6379727"/>
             <a:ext cx="457200" cy="457200"/>
           </a:xfrm>
           <a:prstGeom prst="rect">
@@ -4602,7 +4602,7 @@
         </p:nvSpPr>
         <p:spPr>
           <a:xfrm>
-            <a:off x="6865482" y="6747542"/>
+            <a:off x="6865482" y="6776117"/>
             <a:ext cx="1234633" cy="261610"/>
           </a:xfrm>
           <a:prstGeom prst="rect">
@@ -4841,7 +4841,7 @@
         </p:nvSpPr>
         <p:spPr bwMode="auto">
           <a:xfrm>
-            <a:off x="8767229" y="3503468"/>
+            <a:off x="8738811" y="3476123"/>
             <a:ext cx="2304288" cy="276999"/>
           </a:xfrm>
           <a:prstGeom prst="rect">
@@ -5015,7 +5015,7 @@
         </p:blipFill>
         <p:spPr bwMode="auto">
           <a:xfrm>
-            <a:off x="9493858" y="4027520"/>
+            <a:off x="9493858" y="3972928"/>
             <a:ext cx="762000" cy="762000"/>
           </a:xfrm>
           <a:prstGeom prst="rect">
@@ -5062,7 +5062,7 @@
         </p:nvSpPr>
         <p:spPr bwMode="auto">
           <a:xfrm>
-            <a:off x="8746147" y="4791109"/>
+            <a:off x="8746147" y="4736517"/>
             <a:ext cx="2279650" cy="276999"/>
           </a:xfrm>
           <a:prstGeom prst="rect">
@@ -5677,7 +5677,7 @@
         </p:blipFill>
         <p:spPr>
           <a:xfrm>
-            <a:off x="6426010" y="1051634"/>
+            <a:off x="6422832" y="1074717"/>
             <a:ext cx="381000" cy="381000"/>
           </a:xfrm>
           <a:prstGeom prst="rect">
@@ -5713,7 +5713,7 @@
         </p:blipFill>
         <p:spPr>
           <a:xfrm>
-            <a:off x="2147444" y="1070220"/>
+            <a:off x="2147440" y="1069786"/>
             <a:ext cx="381000" cy="381000"/>
           </a:xfrm>
           <a:prstGeom prst="rect">
@@ -5749,7 +5749,7 @@
         </p:blipFill>
         <p:spPr>
           <a:xfrm>
-            <a:off x="1090869" y="970755"/>
+            <a:off x="1076174" y="971719"/>
             <a:ext cx="381000" cy="381000"/>
           </a:xfrm>
           <a:prstGeom prst="rect">
@@ -5785,7 +5785,7 @@
         </p:blipFill>
         <p:spPr>
           <a:xfrm>
-            <a:off x="6400173" y="2577403"/>
+            <a:off x="6422832" y="2591580"/>
             <a:ext cx="381000" cy="381000"/>
           </a:xfrm>
           <a:prstGeom prst="rect">
@@ -5821,7 +5821,7 @@
         </p:blipFill>
         <p:spPr>
           <a:xfrm>
-            <a:off x="2105179" y="2577403"/>
+            <a:off x="2122200" y="2575977"/>
             <a:ext cx="381000" cy="381000"/>
           </a:xfrm>
           <a:prstGeom prst="rect">
@@ -5858,7 +5858,7 @@
         </p:blipFill>
         <p:spPr bwMode="auto">
           <a:xfrm>
-            <a:off x="5051641" y="5460193"/>
+            <a:off x="5051641" y="5488768"/>
             <a:ext cx="457200" cy="457200"/>
           </a:xfrm>
           <a:prstGeom prst="rect">
@@ -5977,7 +5977,7 @@
         </p:blipFill>
         <p:spPr>
           <a:xfrm>
-            <a:off x="5086967" y="4185653"/>
+            <a:off x="5067827" y="4148563"/>
             <a:ext cx="381000" cy="381000"/>
           </a:xfrm>
           <a:prstGeom prst="rect">
@@ -6013,7 +6013,7 @@
         </p:blipFill>
         <p:spPr>
           <a:xfrm>
-            <a:off x="5091670" y="6167816"/>
+            <a:off x="5091670" y="6196391"/>
             <a:ext cx="381000" cy="381000"/>
           </a:xfrm>
           <a:prstGeom prst="rect">

</xml_diff>